<commit_message>
add study results of bug / improvement reporting
</commit_message>
<xml_diff>
--- a/Testing CAM Tools.pptx
+++ b/Testing CAM Tools.pptx
@@ -4047,7 +4047,7 @@
                   <a:schemeClr val="dk1"/>
                 </a:solidFill>
               </a:rPr>
-              <a:t>CAMEL-issue with arrows flipping if the concepts are too close] and show you how I discovered this bug, how I can reproduce it and how I would fill out the bug report.</a:t>
+              <a:t>CAMEL-issue with arrows flipping if the concepts are too close] and show you how I discovered this bug, how I can reproduce it and how I would fill out the bug report].</a:t>
             </a:r>
           </a:p>
           <a:p>
@@ -4090,11 +4090,7 @@
             </a:r>
             <a:r>
               <a:rPr lang="en-US" dirty="0"/>
-              <a:t>can be change in the future if we have </a:t>
-            </a:r>
-            <a:r>
-              <a:rPr lang="en-US"/>
-              <a:t>further developed our CAM tools.</a:t>
+              <a:t>can be change in the future if we have further developed our CAM tools.</a:t>
             </a:r>
             <a:endParaRPr lang="en-US" noProof="0" dirty="0"/>
           </a:p>
@@ -4517,10 +4513,10 @@
                 <a:cs typeface="Arial"/>
                 <a:sym typeface="Arial"/>
               </a:rPr>
-              <a:t>Collect data, which is called Cognitive-Affective Map Extended Logic (C.A.M.E.L.). CAMEL is an open-source software to draw Cognitive-Affective Maps and </a:t>
-            </a:r>
-            <a:r>
-              <a:rPr lang="en-US" sz="1100" b="0" i="0" u="none" strike="noStrike" cap="none" dirty="0" err="1">
+              <a:t>Collect data, which is called Cognitive-Affective Map Extended Logic (C.A.M.E.L.). CAMEL is an open-source software to draw Cognitive-Affective Maps and it aims to offer people an easy and intuitive interface on which they could draw their own mind map within online studies. There is a participant view and a researcher view to set up studies and it is possible to change </a:t>
+            </a:r>
+            <a:r>
+              <a:rPr lang="en-US" sz="1100" b="0" i="0" u="none" strike="noStrike" cap="none">
                 <a:solidFill>
                   <a:srgbClr val="000000"/>
                 </a:solidFill>
@@ -4530,7 +4526,7 @@
                 <a:cs typeface="Arial"/>
                 <a:sym typeface="Arial"/>
               </a:rPr>
-              <a:t>itaims</a:t>
+              <a:t>over multiple </a:t>
             </a:r>
             <a:r>
               <a:rPr lang="en-US" sz="1100" b="0" i="0" u="none" strike="noStrike" cap="none" dirty="0">
@@ -4543,7 +4539,7 @@
                 <a:cs typeface="Arial"/>
                 <a:sym typeface="Arial"/>
               </a:rPr>
-              <a:t> to offer people an easy and intuitive interface on which they could draw their own mind map within online studies, for example. There is a participant view and a researcher view to set up studies and it is possible to change over 10 parameters of the C.A.M.E.L. software (e.g. force to full screen, or change language to Chinese) to adapt CAM studies.</a:t>
+              <a:t>parameters of the C.A.M.E.L. software (e.g. force to full screen, or change language to Chinese) to adapt CAM studies.</a:t>
             </a:r>
           </a:p>
           <a:p>

</xml_diff>